<commit_message>
fix: remove decorative dots from cover slide gradient panel
</commit_message>
<xml_diff>
--- a/OpenTeams_x_IBM.pptx
+++ b/OpenTeams_x_IBM.pptx
@@ -3156,189 +3156,9 @@
           </a:p>
         </p:txBody>
       </p:sp>
-      <p:sp>
-        <p:nvSpPr>
-          <p:cNvPr id="3" name="Oval 2"/>
-          <p:cNvSpPr/>
-          <p:nvPr/>
-        </p:nvSpPr>
-        <p:spPr>
-          <a:xfrm>
-            <a:off x="7498079" y="1371600"/>
-            <a:ext cx="320040" cy="320040"/>
-          </a:xfrm>
-          <a:prstGeom prst="ellipse">
-            <a:avLst/>
-          </a:prstGeom>
-          <a:solidFill>
-            <a:srgbClr val="FAA944">
-              <a:alpha val="30000"/>
-            </a:srgbClr>
-          </a:solidFill>
-          <a:ln>
-            <a:noFill/>
-          </a:ln>
-        </p:spPr>
-        <p:style>
-          <a:lnRef idx="1">
-            <a:schemeClr val="accent1"/>
-          </a:lnRef>
-          <a:fillRef idx="3">
-            <a:schemeClr val="accent1"/>
-          </a:fillRef>
-          <a:effectRef idx="2">
-            <a:schemeClr val="accent1"/>
-          </a:effectRef>
-          <a:fontRef idx="minor">
-            <a:schemeClr val="lt1"/>
-          </a:fontRef>
-        </p:style>
-        <p:txBody>
-          <a:bodyPr rtlCol="0" anchor="ctr"/>
-          <a:lstStyle/>
-          <a:p>
-            <a:pPr algn="ctr"/>
-          </a:p>
-        </p:txBody>
-      </p:sp>
-      <p:sp>
-        <p:nvSpPr>
-          <p:cNvPr id="4" name="Oval 3"/>
-          <p:cNvSpPr/>
-          <p:nvPr/>
-        </p:nvSpPr>
-        <p:spPr>
-          <a:xfrm>
-            <a:off x="8961120" y="1828800"/>
-            <a:ext cx="320040" cy="320040"/>
-          </a:xfrm>
-          <a:prstGeom prst="ellipse">
-            <a:avLst/>
-          </a:prstGeom>
-          <a:solidFill>
-            <a:srgbClr val="FF8A69">
-              <a:alpha val="30000"/>
-            </a:srgbClr>
-          </a:solidFill>
-          <a:ln>
-            <a:noFill/>
-          </a:ln>
-        </p:spPr>
-        <p:style>
-          <a:lnRef idx="1">
-            <a:schemeClr val="accent1"/>
-          </a:lnRef>
-          <a:fillRef idx="3">
-            <a:schemeClr val="accent1"/>
-          </a:fillRef>
-          <a:effectRef idx="2">
-            <a:schemeClr val="accent1"/>
-          </a:effectRef>
-          <a:fontRef idx="minor">
-            <a:schemeClr val="lt1"/>
-          </a:fontRef>
-        </p:style>
-        <p:txBody>
-          <a:bodyPr rtlCol="0" anchor="ctr"/>
-          <a:lstStyle/>
-          <a:p>
-            <a:pPr algn="ctr"/>
-          </a:p>
-        </p:txBody>
-      </p:sp>
-      <p:sp>
-        <p:nvSpPr>
-          <p:cNvPr id="5" name="Oval 4"/>
-          <p:cNvSpPr/>
-          <p:nvPr/>
-        </p:nvSpPr>
-        <p:spPr>
-          <a:xfrm>
-            <a:off x="8046720" y="4572000"/>
-            <a:ext cx="320040" cy="320040"/>
-          </a:xfrm>
-          <a:prstGeom prst="ellipse">
-            <a:avLst/>
-          </a:prstGeom>
-          <a:solidFill>
-            <a:srgbClr val="4D75FE">
-              <a:alpha val="30000"/>
-            </a:srgbClr>
-          </a:solidFill>
-          <a:ln>
-            <a:noFill/>
-          </a:ln>
-        </p:spPr>
-        <p:style>
-          <a:lnRef idx="1">
-            <a:schemeClr val="accent1"/>
-          </a:lnRef>
-          <a:fillRef idx="3">
-            <a:schemeClr val="accent1"/>
-          </a:fillRef>
-          <a:effectRef idx="2">
-            <a:schemeClr val="accent1"/>
-          </a:effectRef>
-          <a:fontRef idx="minor">
-            <a:schemeClr val="lt1"/>
-          </a:fontRef>
-        </p:style>
-        <p:txBody>
-          <a:bodyPr rtlCol="0" anchor="ctr"/>
-          <a:lstStyle/>
-          <a:p>
-            <a:pPr algn="ctr"/>
-          </a:p>
-        </p:txBody>
-      </p:sp>
-      <p:sp>
-        <p:nvSpPr>
-          <p:cNvPr id="6" name="Oval 5"/>
-          <p:cNvSpPr/>
-          <p:nvPr/>
-        </p:nvSpPr>
-        <p:spPr>
-          <a:xfrm>
-            <a:off x="9601200" y="3840480"/>
-            <a:ext cx="320040" cy="320040"/>
-          </a:xfrm>
-          <a:prstGeom prst="ellipse">
-            <a:avLst/>
-          </a:prstGeom>
-          <a:solidFill>
-            <a:srgbClr val="FAA944">
-              <a:alpha val="30000"/>
-            </a:srgbClr>
-          </a:solidFill>
-          <a:ln>
-            <a:noFill/>
-          </a:ln>
-        </p:spPr>
-        <p:style>
-          <a:lnRef idx="1">
-            <a:schemeClr val="accent1"/>
-          </a:lnRef>
-          <a:fillRef idx="3">
-            <a:schemeClr val="accent1"/>
-          </a:fillRef>
-          <a:effectRef idx="2">
-            <a:schemeClr val="accent1"/>
-          </a:effectRef>
-          <a:fontRef idx="minor">
-            <a:schemeClr val="lt1"/>
-          </a:fontRef>
-        </p:style>
-        <p:txBody>
-          <a:bodyPr rtlCol="0" anchor="ctr"/>
-          <a:lstStyle/>
-          <a:p>
-            <a:pPr algn="ctr"/>
-          </a:p>
-        </p:txBody>
-      </p:sp>
       <p:pic>
         <p:nvPicPr>
-          <p:cNvPr id="7" name="Picture 6" descr="OpenTeams-favicon-01.png"/>
+          <p:cNvPr id="3" name="Picture 2" descr="OpenTeams-favicon-01.png"/>
           <p:cNvPicPr>
             <a:picLocks noChangeAspect="1"/>
           </p:cNvPicPr>
@@ -3362,7 +3182,7 @@
       </p:pic>
       <p:pic>
         <p:nvPicPr>
-          <p:cNvPr id="8" name="Picture 7" descr="OT-new-logo-final.png"/>
+          <p:cNvPr id="4" name="Picture 3" descr="OT-new-logo-final.png"/>
           <p:cNvPicPr>
             <a:picLocks noChangeAspect="1"/>
           </p:cNvPicPr>
@@ -3386,7 +3206,7 @@
       </p:pic>
       <p:sp>
         <p:nvSpPr>
-          <p:cNvPr id="9" name="TextBox 8"/>
+          <p:cNvPr id="5" name="TextBox 4"/>
           <p:cNvSpPr txBox="1"/>
           <p:nvPr/>
         </p:nvSpPr>
@@ -3422,7 +3242,7 @@
       </p:sp>
       <p:sp>
         <p:nvSpPr>
-          <p:cNvPr id="10" name="TextBox 9"/>
+          <p:cNvPr id="6" name="TextBox 5"/>
           <p:cNvSpPr txBox="1"/>
           <p:nvPr/>
         </p:nvSpPr>
@@ -3477,7 +3297,7 @@
       </p:sp>
       <p:sp>
         <p:nvSpPr>
-          <p:cNvPr id="11" name="Rounded Rectangle 10"/>
+          <p:cNvPr id="7" name="Rounded Rectangle 6"/>
           <p:cNvSpPr/>
           <p:nvPr/>
         </p:nvSpPr>
@@ -3538,7 +3358,7 @@
       </p:sp>
       <p:sp>
         <p:nvSpPr>
-          <p:cNvPr id="12" name="TextBox 11"/>
+          <p:cNvPr id="8" name="TextBox 7"/>
           <p:cNvSpPr txBox="1"/>
           <p:nvPr/>
         </p:nvSpPr>

</xml_diff>

<commit_message>
refactor: extract SlideBuilder, add tests, warn on team truncation
- Extract SlideBuilder class to slide_builder.py for maintainability
- Add ACCENT_ROTATION property to eliminate duplicated color lists
- Log warning when team slide truncates members beyond 6
- Add 22 tests covering color utils, spec validation, and generation smoke tests
</commit_message>
<xml_diff>
--- a/OpenTeams_x_IBM.pptx
+++ b/OpenTeams_x_IBM.pptx
@@ -4375,7 +4375,7 @@
             <a:avLst/>
           </a:prstGeom>
           <a:solidFill>
-            <a:srgbClr val="4D75FE"/>
+            <a:srgbClr val="022791"/>
           </a:solidFill>
           <a:ln>
             <a:noFill/>
@@ -4402,7 +4402,7 @@
             <a:pPr algn="ctr">
               <a:defRPr sz="1600" b="1">
                 <a:solidFill>
-                  <a:srgbClr val="000000"/>
+                  <a:srgbClr val="FFFFFF"/>
                 </a:solidFill>
                 <a:latin typeface="Inter Tight"/>
               </a:defRPr>
@@ -4467,7 +4467,7 @@
             <a:avLst/>
           </a:prstGeom>
           <a:solidFill>
-            <a:srgbClr val="022791"/>
+            <a:srgbClr val="FAA944"/>
           </a:solidFill>
           <a:ln>
             <a:noFill/>
@@ -4494,7 +4494,7 @@
             <a:pPr algn="ctr">
               <a:defRPr sz="1600" b="1">
                 <a:solidFill>
-                  <a:srgbClr val="FFFFFF"/>
+                  <a:srgbClr val="000000"/>
                 </a:solidFill>
                 <a:latin typeface="Inter Tight"/>
               </a:defRPr>

</xml_diff>